<commit_message>
Add youtube Ansible Tower link
</commit_message>
<xml_diff>
--- a/Ansible ABC's and Tower Tips.pptx
+++ b/Ansible ABC's and Tower Tips.pptx
@@ -11583,7 +11583,9 @@
         </p:nvSpPr>
         <p:spPr/>
         <p:txBody>
-          <a:bodyPr/>
+          <a:bodyPr>
+            <a:normAutofit/>
+          </a:bodyPr>
           <a:lstStyle/>
           <a:p>
             <a:pPr marL="0" indent="0">
@@ -11591,27 +11593,51 @@
             </a:pPr>
             <a:r>
               <a:rPr lang="en-US" dirty="0"/>
-              <a:t>Docs</a:t>
+              <a:t>Demo source</a:t>
             </a:r>
           </a:p>
           <a:p>
             <a:r>
               <a:rPr lang="en-US" dirty="0"/>
-              <a:t>  </a:t>
-            </a:r>
-            <a:r>
-              <a:rPr lang="en-US" dirty="0">
+              <a:t>YAML playbooks, Vagrant private network setup, and slide deck</a:t>
+            </a:r>
+          </a:p>
+          <a:p>
+            <a:r>
+              <a:rPr lang="en-US" dirty="0"/>
+              <a:t>Demo source:        </a:t>
+            </a:r>
+            <a:r>
+              <a:rPr lang="en-IE" u="sng" dirty="0">
                 <a:hlinkClick r:id="rId2"/>
               </a:rPr>
-              <a:t>Ansible docs – User guide, Quickstart</a:t>
+              <a:t>https://github.com/reideast/ansible-sandbox</a:t>
             </a:r>
             <a:endParaRPr lang="en-US" dirty="0"/>
+          </a:p>
+          <a:p>
+            <a:pPr marL="0" indent="0">
+              <a:buNone/>
+            </a:pPr>
+            <a:r>
+              <a:rPr lang="en-US" dirty="0"/>
+              <a:t>Docs</a:t>
+            </a:r>
           </a:p>
           <a:p>
             <a:r>
               <a:rPr lang="en-US" dirty="0">
                 <a:hlinkClick r:id="rId3"/>
               </a:rPr>
+              <a:t>Ansible docs – User guide, Quickstart</a:t>
+            </a:r>
+            <a:endParaRPr lang="en-US" dirty="0"/>
+          </a:p>
+          <a:p>
+            <a:r>
+              <a:rPr lang="en-US" dirty="0">
+                <a:hlinkClick r:id="rId4"/>
+              </a:rPr>
               <a:t>Ansible: Up and Running (Safari books)</a:t>
             </a:r>
             <a:endParaRPr lang="en-US" dirty="0"/>
@@ -11621,34 +11647,6 @@
               <a:buNone/>
             </a:pPr>
             <a:r>
-              <a:rPr lang="en-US" dirty="0"/>
-              <a:t>Demo source</a:t>
-            </a:r>
-          </a:p>
-          <a:p>
-            <a:r>
-              <a:rPr lang="en-US" dirty="0"/>
-              <a:t>YAML playbooks, Vagrant private network setup, and slide deck</a:t>
-            </a:r>
-          </a:p>
-          <a:p>
-            <a:r>
-              <a:rPr lang="en-US" dirty="0"/>
-              <a:t>Demo source:        </a:t>
-            </a:r>
-            <a:r>
-              <a:rPr lang="en-IE" u="sng" dirty="0">
-                <a:hlinkClick r:id="rId4"/>
-              </a:rPr>
-              <a:t>https://github.com/reideast/ansible-sandbox</a:t>
-            </a:r>
-            <a:endParaRPr lang="en-US" dirty="0"/>
-          </a:p>
-          <a:p>
-            <a:pPr marL="0" indent="0">
-              <a:buNone/>
-            </a:pPr>
-            <a:r>
               <a:rPr lang="en-IE" dirty="0"/>
               <a:t>Other Resources</a:t>
             </a:r>
@@ -11656,12 +11654,48 @@
           <a:p>
             <a:r>
               <a:rPr lang="en-IE" dirty="0"/>
-              <a:t>Apache web server </a:t>
+              <a:t>YouTube: </a:t>
             </a:r>
             <a:r>
               <a:rPr lang="en-IE" dirty="0">
                 <a:hlinkClick r:id="rId5"/>
               </a:rPr>
+              <a:t>Red Hat Ansible Tower Demo </a:t>
+            </a:r>
+            <a:r>
+              <a:rPr lang="en-IE" dirty="0">
+                <a:hlinkClick r:id="rId5"/>
+              </a:rPr>
+              <a:t>-</a:t>
+            </a:r>
+            <a:r>
+              <a:rPr lang="en-IE" dirty="0">
+                <a:hlinkClick r:id="rId5"/>
+              </a:rPr>
+              <a:t> Linux</a:t>
+            </a:r>
+            <a:r>
+              <a:rPr lang="en-IE" dirty="0">
+                <a:latin typeface="Consolas" panose="020B0609020204030204" pitchFamily="49" charset="0"/>
+                <a:cs typeface="Consolas" panose="020B0609020204030204" pitchFamily="49" charset="0"/>
+                <a:hlinkClick r:id="rId5"/>
+              </a:rPr>
+              <a:t>0</a:t>
+            </a:r>
+            <a:endParaRPr lang="en-IE" dirty="0">
+              <a:latin typeface="Consolas" panose="020B0609020204030204" pitchFamily="49" charset="0"/>
+              <a:cs typeface="Consolas" panose="020B0609020204030204" pitchFamily="49" charset="0"/>
+            </a:endParaRPr>
+          </a:p>
+          <a:p>
+            <a:r>
+              <a:rPr lang="en-IE" dirty="0"/>
+              <a:t>Apache web server </a:t>
+            </a:r>
+            <a:r>
+              <a:rPr lang="en-IE" dirty="0">
+                <a:hlinkClick r:id="rId6"/>
+              </a:rPr>
               <a:t>geerlingguy/ansible-role-apache</a:t>
             </a:r>
             <a:endParaRPr lang="en-IE" dirty="0"/>
@@ -11673,7 +11707,7 @@
             </a:r>
             <a:r>
               <a:rPr lang="en-IE" dirty="0">
-                <a:hlinkClick r:id="rId6"/>
+                <a:hlinkClick r:id="rId7"/>
               </a:rPr>
               <a:t>bertrandszoghy/vagrant_ansible_private_network_example</a:t>
             </a:r>
@@ -11726,14 +11760,14 @@
           <p:nvPr/>
         </p:nvPicPr>
         <p:blipFill>
-          <a:blip r:embed="rId7"/>
+          <a:blip r:embed="rId8"/>
           <a:stretch>
             <a:fillRect/>
           </a:stretch>
         </p:blipFill>
         <p:spPr>
           <a:xfrm>
-            <a:off x="5664648" y="3297065"/>
+            <a:off x="5681581" y="1967799"/>
             <a:ext cx="254726" cy="254726"/>
           </a:xfrm>
           <a:prstGeom prst="rect">
@@ -11776,11 +11810,11 @@
             <p:nvPr/>
           </p:nvPicPr>
           <p:blipFill>
-            <a:blip r:embed="rId8">
+            <a:blip r:embed="rId9">
               <a:extLst>
                 <a:ext uri="{BEBA8EAE-BF5A-486C-A8C5-ECC9F3942E4B}">
                   <a14:imgProps xmlns:a14="http://schemas.microsoft.com/office/drawing/2010/main">
-                    <a14:imgLayer r:embed="rId9">
+                    <a14:imgLayer r:embed="rId10">
                       <a14:imgEffect>
                         <a14:saturation sat="0"/>
                       </a14:imgEffect>

</xml_diff>